<commit_message>
fix bugs in normalization for monte carlo and grid
</commit_message>
<xml_diff>
--- a/classes/stats2016/Lecture06.pptx
+++ b/classes/stats2016/Lecture06.pptx
@@ -238,7 +238,7 @@
             <a:fld id="{423AD07F-71EA-4875-813B-E57FF907F655}" type="datetimeFigureOut">
               <a:rPr lang="en-US" smtClean="0"/>
               <a:pPr/>
-              <a:t>2/7/2016</a:t>
+              <a:t>2/16/2016</a:t>
             </a:fld>
             <a:endParaRPr lang="en-US"/>
           </a:p>
@@ -2605,7 +2605,7 @@
             <a:fld id="{1D8BD707-D9CF-40AE-B4C6-C98DA3205C09}" type="datetimeFigureOut">
               <a:rPr lang="en-US" smtClean="0"/>
               <a:pPr/>
-              <a:t>2/7/2016</a:t>
+              <a:t>2/16/2016</a:t>
             </a:fld>
             <a:endParaRPr lang="en-US"/>
           </a:p>
@@ -2772,7 +2772,7 @@
             <a:fld id="{1D8BD707-D9CF-40AE-B4C6-C98DA3205C09}" type="datetimeFigureOut">
               <a:rPr lang="en-US" smtClean="0"/>
               <a:pPr/>
-              <a:t>2/7/2016</a:t>
+              <a:t>2/16/2016</a:t>
             </a:fld>
             <a:endParaRPr lang="en-US"/>
           </a:p>
@@ -2949,7 +2949,7 @@
             <a:fld id="{1D8BD707-D9CF-40AE-B4C6-C98DA3205C09}" type="datetimeFigureOut">
               <a:rPr lang="en-US" smtClean="0"/>
               <a:pPr/>
-              <a:t>2/7/2016</a:t>
+              <a:t>2/16/2016</a:t>
             </a:fld>
             <a:endParaRPr lang="en-US"/>
           </a:p>
@@ -3116,7 +3116,7 @@
             <a:fld id="{1D8BD707-D9CF-40AE-B4C6-C98DA3205C09}" type="datetimeFigureOut">
               <a:rPr lang="en-US" smtClean="0"/>
               <a:pPr/>
-              <a:t>2/7/2016</a:t>
+              <a:t>2/16/2016</a:t>
             </a:fld>
             <a:endParaRPr lang="en-US"/>
           </a:p>
@@ -3359,7 +3359,7 @@
             <a:fld id="{1D8BD707-D9CF-40AE-B4C6-C98DA3205C09}" type="datetimeFigureOut">
               <a:rPr lang="en-US" smtClean="0"/>
               <a:pPr/>
-              <a:t>2/7/2016</a:t>
+              <a:t>2/16/2016</a:t>
             </a:fld>
             <a:endParaRPr lang="en-US"/>
           </a:p>
@@ -3644,7 +3644,7 @@
             <a:fld id="{1D8BD707-D9CF-40AE-B4C6-C98DA3205C09}" type="datetimeFigureOut">
               <a:rPr lang="en-US" smtClean="0"/>
               <a:pPr/>
-              <a:t>2/7/2016</a:t>
+              <a:t>2/16/2016</a:t>
             </a:fld>
             <a:endParaRPr lang="en-US"/>
           </a:p>
@@ -4063,7 +4063,7 @@
             <a:fld id="{1D8BD707-D9CF-40AE-B4C6-C98DA3205C09}" type="datetimeFigureOut">
               <a:rPr lang="en-US" smtClean="0"/>
               <a:pPr/>
-              <a:t>2/7/2016</a:t>
+              <a:t>2/16/2016</a:t>
             </a:fld>
             <a:endParaRPr lang="en-US"/>
           </a:p>
@@ -4178,7 +4178,7 @@
             <a:fld id="{1D8BD707-D9CF-40AE-B4C6-C98DA3205C09}" type="datetimeFigureOut">
               <a:rPr lang="en-US" smtClean="0"/>
               <a:pPr/>
-              <a:t>2/7/2016</a:t>
+              <a:t>2/16/2016</a:t>
             </a:fld>
             <a:endParaRPr lang="en-US"/>
           </a:p>
@@ -4270,7 +4270,7 @@
             <a:fld id="{1D8BD707-D9CF-40AE-B4C6-C98DA3205C09}" type="datetimeFigureOut">
               <a:rPr lang="en-US" smtClean="0"/>
               <a:pPr/>
-              <a:t>2/7/2016</a:t>
+              <a:t>2/16/2016</a:t>
             </a:fld>
             <a:endParaRPr lang="en-US"/>
           </a:p>
@@ -4544,7 +4544,7 @@
             <a:fld id="{1D8BD707-D9CF-40AE-B4C6-C98DA3205C09}" type="datetimeFigureOut">
               <a:rPr lang="en-US" smtClean="0"/>
               <a:pPr/>
-              <a:t>2/7/2016</a:t>
+              <a:t>2/16/2016</a:t>
             </a:fld>
             <a:endParaRPr lang="en-US"/>
           </a:p>
@@ -4794,7 +4794,7 @@
             <a:fld id="{1D8BD707-D9CF-40AE-B4C6-C98DA3205C09}" type="datetimeFigureOut">
               <a:rPr lang="en-US" smtClean="0"/>
               <a:pPr/>
-              <a:t>2/7/2016</a:t>
+              <a:t>2/16/2016</a:t>
             </a:fld>
             <a:endParaRPr lang="en-US"/>
           </a:p>
@@ -5004,7 +5004,7 @@
             <a:fld id="{1D8BD707-D9CF-40AE-B4C6-C98DA3205C09}" type="datetimeFigureOut">
               <a:rPr lang="en-US" smtClean="0"/>
               <a:pPr/>
-              <a:t>2/7/2016</a:t>
+              <a:t>2/16/2016</a:t>
             </a:fld>
             <a:endParaRPr lang="en-US"/>
           </a:p>
@@ -5872,70 +5872,62 @@
           <a:chExt cx="0" cy="0"/>
         </a:xfrm>
       </p:grpSpPr>
-      <p:sp>
-        <p:nvSpPr>
-          <p:cNvPr id="4" name="Rectangle 3"/>
-          <p:cNvSpPr/>
-          <p:nvPr/>
-        </p:nvSpPr>
-        <p:spPr>
-          <a:xfrm>
-            <a:off x="0" y="6550223"/>
-            <a:ext cx="9525000" cy="307777"/>
-          </a:xfrm>
-          <a:prstGeom prst="rect">
-            <a:avLst/>
-          </a:prstGeom>
-        </p:spPr>
-        <p:txBody>
-          <a:bodyPr wrap="square">
-            <a:spAutoFit/>
-          </a:bodyPr>
-          <a:lstStyle/>
-          <a:p>
-            <a:r>
-              <a:rPr lang="en-US" sz="1400" dirty="0" smtClean="0"/>
-              <a:t>https://github.com/afodor/metagenomicsTools/blob/master/src/metropolitan/metropolitanBetaExample</a:t>
-            </a:r>
-            <a:endParaRPr lang="en-US" sz="1400" dirty="0"/>
-          </a:p>
-        </p:txBody>
-      </p:sp>
       <p:pic>
         <p:nvPicPr>
-          <p:cNvPr id="102402" name="Picture 2"/>
+          <p:cNvPr id="3" name="Picture 2"/>
           <p:cNvPicPr>
-            <a:picLocks noChangeAspect="1" noChangeArrowheads="1"/>
+            <a:picLocks noChangeAspect="1"/>
           </p:cNvPicPr>
           <p:nvPr/>
         </p:nvPicPr>
         <p:blipFill>
-          <a:blip r:embed="rId3" cstate="print"/>
-          <a:srcRect/>
+          <a:blip r:embed="rId3"/>
           <a:stretch>
             <a:fillRect/>
           </a:stretch>
         </p:blipFill>
-        <p:spPr bwMode="auto">
-          <a:xfrm>
-            <a:off x="5638800" y="2286000"/>
-            <a:ext cx="3547085" cy="3352800"/>
+        <p:spPr>
+          <a:xfrm>
+            <a:off x="178567" y="115789"/>
+            <a:ext cx="6477000" cy="5295900"/>
           </a:xfrm>
           <a:prstGeom prst="rect">
             <a:avLst/>
           </a:prstGeom>
-          <a:noFill/>
-          <a:ln w="9525">
-            <a:noFill/>
-            <a:miter lim="800000"/>
-            <a:headEnd/>
-            <a:tailEnd/>
-          </a:ln>
         </p:spPr>
       </p:pic>
+      <p:sp>
+        <p:nvSpPr>
+          <p:cNvPr id="4" name="Rectangle 3"/>
+          <p:cNvSpPr/>
+          <p:nvPr/>
+        </p:nvSpPr>
+        <p:spPr>
+          <a:xfrm>
+            <a:off x="0" y="6550223"/>
+            <a:ext cx="9525000" cy="307777"/>
+          </a:xfrm>
+          <a:prstGeom prst="rect">
+            <a:avLst/>
+          </a:prstGeom>
+        </p:spPr>
+        <p:txBody>
+          <a:bodyPr wrap="square">
+            <a:spAutoFit/>
+          </a:bodyPr>
+          <a:lstStyle/>
+          <a:p>
+            <a:r>
+              <a:rPr lang="en-US" sz="1400" dirty="0" smtClean="0"/>
+              <a:t>https://github.com/afodor/metagenomicsTools/blob/master/src/metropolitan/metropolitanBetaExample</a:t>
+            </a:r>
+            <a:endParaRPr lang="en-US" sz="1400" dirty="0"/>
+          </a:p>
+        </p:txBody>
+      </p:sp>
       <p:pic>
         <p:nvPicPr>
-          <p:cNvPr id="102403" name="Picture 3"/>
+          <p:cNvPr id="102402" name="Picture 2"/>
           <p:cNvPicPr>
             <a:picLocks noChangeAspect="1" noChangeArrowheads="1"/>
           </p:cNvPicPr>
@@ -5950,8 +5942,8 @@
         </p:blipFill>
         <p:spPr bwMode="auto">
           <a:xfrm>
-            <a:off x="152400" y="228600"/>
-            <a:ext cx="5670000" cy="5715000"/>
+            <a:off x="5707071" y="2286000"/>
+            <a:ext cx="3478814" cy="3288268"/>
           </a:xfrm>
           <a:prstGeom prst="rect">
             <a:avLst/>
@@ -5973,7 +5965,7 @@
         </p:nvCxnSpPr>
         <p:spPr>
           <a:xfrm flipV="1">
-            <a:off x="609600" y="5867400"/>
+            <a:off x="457200" y="5410200"/>
             <a:ext cx="304800" cy="304800"/>
           </a:xfrm>
           <a:prstGeom prst="straightConnector1">
@@ -6006,7 +5998,7 @@
         </p:nvSpPr>
         <p:spPr>
           <a:xfrm>
-            <a:off x="609600" y="6031468"/>
+            <a:off x="457200" y="5574268"/>
             <a:ext cx="5614935" cy="369332"/>
           </a:xfrm>
           <a:prstGeom prst="rect">
@@ -7430,34 +7422,26 @@
       </p:grpSpPr>
       <p:pic>
         <p:nvPicPr>
-          <p:cNvPr id="104451" name="Picture 3"/>
+          <p:cNvPr id="3" name="Picture 2"/>
           <p:cNvPicPr>
-            <a:picLocks noChangeAspect="1" noChangeArrowheads="1"/>
+            <a:picLocks noChangeAspect="1"/>
           </p:cNvPicPr>
           <p:nvPr/>
         </p:nvPicPr>
         <p:blipFill>
-          <a:blip r:embed="rId3" cstate="print"/>
-          <a:srcRect/>
+          <a:blip r:embed="rId3"/>
           <a:stretch>
             <a:fillRect/>
           </a:stretch>
         </p:blipFill>
-        <p:spPr bwMode="auto">
-          <a:xfrm>
-            <a:off x="152400" y="457199"/>
-            <a:ext cx="5334000" cy="5364307"/>
+        <p:spPr>
+          <a:xfrm>
+            <a:off x="152400" y="444077"/>
+            <a:ext cx="6115050" cy="5362575"/>
           </a:xfrm>
           <a:prstGeom prst="rect">
             <a:avLst/>
           </a:prstGeom>
-          <a:noFill/>
-          <a:ln w="9525">
-            <a:noFill/>
-            <a:miter lim="800000"/>
-            <a:headEnd/>
-            <a:tailEnd/>
-          </a:ln>
         </p:spPr>
       </p:pic>
       <p:sp>
@@ -7490,38 +7474,6 @@
           </a:p>
         </p:txBody>
       </p:sp>
-      <p:pic>
-        <p:nvPicPr>
-          <p:cNvPr id="104450" name="Picture 2"/>
-          <p:cNvPicPr>
-            <a:picLocks noChangeAspect="1" noChangeArrowheads="1"/>
-          </p:cNvPicPr>
-          <p:nvPr/>
-        </p:nvPicPr>
-        <p:blipFill>
-          <a:blip r:embed="rId4" cstate="print"/>
-          <a:srcRect/>
-          <a:stretch>
-            <a:fillRect/>
-          </a:stretch>
-        </p:blipFill>
-        <p:spPr bwMode="auto">
-          <a:xfrm>
-            <a:off x="5263910" y="1295400"/>
-            <a:ext cx="3880090" cy="3886200"/>
-          </a:xfrm>
-          <a:prstGeom prst="rect">
-            <a:avLst/>
-          </a:prstGeom>
-          <a:noFill/>
-          <a:ln w="9525">
-            <a:noFill/>
-            <a:miter lim="800000"/>
-            <a:headEnd/>
-            <a:tailEnd/>
-          </a:ln>
-        </p:spPr>
-      </p:pic>
       <p:cxnSp>
         <p:nvCxnSpPr>
           <p:cNvPr id="8" name="Straight Arrow Connector 7"/>
@@ -7643,6 +7595,30 @@
           </a:p>
         </p:txBody>
       </p:sp>
+      <p:pic>
+        <p:nvPicPr>
+          <p:cNvPr id="2" name="Picture 1"/>
+          <p:cNvPicPr>
+            <a:picLocks noChangeAspect="1"/>
+          </p:cNvPicPr>
+          <p:nvPr/>
+        </p:nvPicPr>
+        <p:blipFill>
+          <a:blip r:embed="rId4"/>
+          <a:stretch>
+            <a:fillRect/>
+          </a:stretch>
+        </p:blipFill>
+        <p:spPr>
+          <a:xfrm>
+            <a:off x="5283993" y="752900"/>
+            <a:ext cx="3605213" cy="3523400"/>
+          </a:xfrm>
+          <a:prstGeom prst="rect">
+            <a:avLst/>
+          </a:prstGeom>
+        </p:spPr>
+      </p:pic>
     </p:spTree>
   </p:cSld>
   <p:clrMapOvr>
@@ -7670,66 +7646,26 @@
       </p:grpSpPr>
       <p:pic>
         <p:nvPicPr>
-          <p:cNvPr id="105476" name="Picture 4"/>
+          <p:cNvPr id="2" name="Picture 1"/>
           <p:cNvPicPr>
-            <a:picLocks noChangeAspect="1" noChangeArrowheads="1"/>
+            <a:picLocks noChangeAspect="1"/>
           </p:cNvPicPr>
           <p:nvPr/>
         </p:nvPicPr>
         <p:blipFill>
-          <a:blip r:embed="rId3" cstate="print"/>
-          <a:srcRect/>
+          <a:blip r:embed="rId3"/>
           <a:stretch>
             <a:fillRect/>
           </a:stretch>
         </p:blipFill>
-        <p:spPr bwMode="auto">
-          <a:xfrm>
-            <a:off x="609600" y="914400"/>
-            <a:ext cx="5591175" cy="5309098"/>
+        <p:spPr>
+          <a:xfrm>
+            <a:off x="457200" y="685800"/>
+            <a:ext cx="7496175" cy="5391150"/>
           </a:xfrm>
           <a:prstGeom prst="rect">
             <a:avLst/>
           </a:prstGeom>
-          <a:noFill/>
-          <a:ln w="9525">
-            <a:noFill/>
-            <a:miter lim="800000"/>
-            <a:headEnd/>
-            <a:tailEnd/>
-          </a:ln>
-        </p:spPr>
-      </p:pic>
-      <p:pic>
-        <p:nvPicPr>
-          <p:cNvPr id="105474" name="Picture 2"/>
-          <p:cNvPicPr>
-            <a:picLocks noChangeAspect="1" noChangeArrowheads="1"/>
-          </p:cNvPicPr>
-          <p:nvPr/>
-        </p:nvPicPr>
-        <p:blipFill>
-          <a:blip r:embed="rId4" cstate="print"/>
-          <a:srcRect/>
-          <a:stretch>
-            <a:fillRect/>
-          </a:stretch>
-        </p:blipFill>
-        <p:spPr bwMode="auto">
-          <a:xfrm>
-            <a:off x="5572407" y="2057400"/>
-            <a:ext cx="3417180" cy="3276600"/>
-          </a:xfrm>
-          <a:prstGeom prst="rect">
-            <a:avLst/>
-          </a:prstGeom>
-          <a:noFill/>
-          <a:ln w="9525">
-            <a:noFill/>
-            <a:miter lim="800000"/>
-            <a:headEnd/>
-            <a:tailEnd/>
-          </a:ln>
         </p:spPr>
       </p:pic>
       <p:sp>
@@ -7740,7 +7676,7 @@
         </p:nvSpPr>
         <p:spPr>
           <a:xfrm>
-            <a:off x="2819400" y="987623"/>
+            <a:off x="2590800" y="911423"/>
             <a:ext cx="2244653" cy="307777"/>
           </a:xfrm>
           <a:prstGeom prst="rect">
@@ -7778,7 +7714,7 @@
         </p:nvCxnSpPr>
         <p:spPr>
           <a:xfrm flipH="1">
-            <a:off x="2362200" y="1219200"/>
+            <a:off x="2133600" y="1143000"/>
             <a:ext cx="457200" cy="152400"/>
           </a:xfrm>
           <a:prstGeom prst="straightConnector1">
@@ -7833,6 +7769,30 @@
           </a:p>
         </p:txBody>
       </p:sp>
+      <p:pic>
+        <p:nvPicPr>
+          <p:cNvPr id="3" name="Picture 2"/>
+          <p:cNvPicPr>
+            <a:picLocks noChangeAspect="1"/>
+          </p:cNvPicPr>
+          <p:nvPr/>
+        </p:nvPicPr>
+        <p:blipFill>
+          <a:blip r:embed="rId4"/>
+          <a:stretch>
+            <a:fillRect/>
+          </a:stretch>
+        </p:blipFill>
+        <p:spPr>
+          <a:xfrm>
+            <a:off x="5491162" y="685800"/>
+            <a:ext cx="3429000" cy="3455296"/>
+          </a:xfrm>
+          <a:prstGeom prst="rect">
+            <a:avLst/>
+          </a:prstGeom>
+        </p:spPr>
+      </p:pic>
     </p:spTree>
   </p:cSld>
   <p:clrMapOvr>
@@ -8321,14 +8281,7 @@
                 <a:latin typeface="Arial" pitchFamily="34" charset="0"/>
                 <a:cs typeface="Arial" pitchFamily="34" charset="0"/>
               </a:rPr>
-              <a:t> </a:t>
-            </a:r>
-            <a:r>
-              <a:rPr lang="en-US" dirty="0" smtClean="0">
-                <a:latin typeface="Arial" pitchFamily="34" charset="0"/>
-                <a:cs typeface="Arial" pitchFamily="34" charset="0"/>
-              </a:rPr>
-              <a:t>algorithm is one of (many) </a:t>
+              <a:t> algorithm is one of (many) </a:t>
             </a:r>
             <a:r>
               <a:rPr lang="en-US" dirty="0" smtClean="0">
@@ -8827,7 +8780,7 @@
           <a:graphicData uri="http://schemas.openxmlformats.org/presentationml/2006/ole">
             <mc:AlternateContent xmlns:mc="http://schemas.openxmlformats.org/markup-compatibility/2006">
               <mc:Choice xmlns:v="urn:schemas-microsoft-com:vml" Requires="v">
-                <p:oleObj spid="_x0000_s108551" name="Equation" r:id="rId4" imgW="1257120" imgH="330120" progId="Equation.3">
+                <p:oleObj spid="_x0000_s108558" name="Equation" r:id="rId4" imgW="1257120" imgH="330120" progId="Equation.3">
                   <p:embed/>
                 </p:oleObj>
               </mc:Choice>
@@ -9161,67 +9114,59 @@
           <a:chExt cx="0" cy="0"/>
         </a:xfrm>
       </p:grpSpPr>
-      <p:sp>
-        <p:nvSpPr>
-          <p:cNvPr id="4" name="Rectangle 3"/>
-          <p:cNvSpPr/>
-          <p:nvPr/>
-        </p:nvSpPr>
-        <p:spPr>
-          <a:xfrm>
-            <a:off x="0" y="6336268"/>
-            <a:ext cx="9144000" cy="369332"/>
-          </a:xfrm>
-          <a:prstGeom prst="rect">
-            <a:avLst/>
-          </a:prstGeom>
-        </p:spPr>
-        <p:txBody>
-          <a:bodyPr wrap="square">
-            <a:spAutoFit/>
-          </a:bodyPr>
-          <a:lstStyle/>
-          <a:p>
-            <a:r>
-              <a:rPr lang="en-US" dirty="0" smtClean="0"/>
-              <a:t>https://github.com/afodor/metagenomicsTools/blob/master/src/metropolitan/gridBetaExample</a:t>
-            </a:r>
-            <a:endParaRPr lang="en-US" dirty="0"/>
-          </a:p>
-        </p:txBody>
-      </p:sp>
       <p:pic>
         <p:nvPicPr>
-          <p:cNvPr id="5" name="Picture 4"/>
+          <p:cNvPr id="3" name="Picture 2"/>
           <p:cNvPicPr>
-            <a:picLocks noChangeAspect="1" noChangeArrowheads="1"/>
+            <a:picLocks noChangeAspect="1"/>
           </p:cNvPicPr>
           <p:nvPr/>
         </p:nvPicPr>
         <p:blipFill>
-          <a:blip r:embed="rId3" cstate="print"/>
-          <a:srcRect/>
+          <a:blip r:embed="rId3"/>
           <a:stretch>
             <a:fillRect/>
           </a:stretch>
         </p:blipFill>
-        <p:spPr bwMode="auto">
-          <a:xfrm>
-            <a:off x="228600" y="304800"/>
-            <a:ext cx="7166776" cy="3657600"/>
+        <p:spPr>
+          <a:xfrm>
+            <a:off x="114300" y="661987"/>
+            <a:ext cx="7162800" cy="3552825"/>
           </a:xfrm>
           <a:prstGeom prst="rect">
             <a:avLst/>
           </a:prstGeom>
-          <a:noFill/>
-          <a:ln w="9525">
-            <a:noFill/>
-            <a:miter lim="800000"/>
-            <a:headEnd/>
-            <a:tailEnd/>
-          </a:ln>
         </p:spPr>
       </p:pic>
+      <p:sp>
+        <p:nvSpPr>
+          <p:cNvPr id="4" name="Rectangle 3"/>
+          <p:cNvSpPr/>
+          <p:nvPr/>
+        </p:nvSpPr>
+        <p:spPr>
+          <a:xfrm>
+            <a:off x="0" y="6336268"/>
+            <a:ext cx="9144000" cy="369332"/>
+          </a:xfrm>
+          <a:prstGeom prst="rect">
+            <a:avLst/>
+          </a:prstGeom>
+        </p:spPr>
+        <p:txBody>
+          <a:bodyPr wrap="square">
+            <a:spAutoFit/>
+          </a:bodyPr>
+          <a:lstStyle/>
+          <a:p>
+            <a:r>
+              <a:rPr lang="en-US" dirty="0" smtClean="0"/>
+              <a:t>https://github.com/afodor/metagenomicsTools/blob/master/src/metropolitan/gridBetaExample</a:t>
+            </a:r>
+            <a:endParaRPr lang="en-US" dirty="0"/>
+          </a:p>
+        </p:txBody>
+      </p:sp>
       <p:sp>
         <p:nvSpPr>
           <p:cNvPr id="6" name="TextBox 5"/>
@@ -11066,7 +11011,7 @@
           <a:graphicData uri="http://schemas.openxmlformats.org/presentationml/2006/ole">
             <mc:AlternateContent xmlns:mc="http://schemas.openxmlformats.org/markup-compatibility/2006">
               <mc:Choice xmlns:v="urn:schemas-microsoft-com:vml" Requires="v">
-                <p:oleObj spid="_x0000_s54280" name="Equation" r:id="rId4" imgW="1257120" imgH="330120" progId="Equation.3">
+                <p:oleObj spid="_x0000_s54287" name="Equation" r:id="rId4" imgW="1257120" imgH="330120" progId="Equation.3">
                   <p:embed/>
                 </p:oleObj>
               </mc:Choice>

</xml_diff>